<commit_message>
Minor update to Methods section
</commit_message>
<xml_diff>
--- a/GraphicsGenerators/IntrepidTwilight.pptx
+++ b/GraphicsGenerators/IntrepidTwilight.pptx
@@ -6,6 +6,7 @@
   </p:sldMasterIdLst>
   <p:sldIdLst>
     <p:sldId id="256" r:id="rId2"/>
+    <p:sldId id="257" r:id="rId3"/>
   </p:sldIdLst>
   <p:sldSz cx="9144000" cy="6858000" type="screen4x3"/>
   <p:notesSz cx="6858000" cy="9144000"/>
@@ -288,7 +289,7 @@
           <a:p>
             <a:fld id="{2BACF29F-B6FF-4964-817E-FDF12FC66187}" type="datetimeFigureOut">
               <a:rPr lang="en-US" smtClean="0"/>
-              <a:t>7/10/2015</a:t>
+              <a:t>5/31/2016</a:t>
             </a:fld>
             <a:endParaRPr lang="en-US"/>
           </a:p>
@@ -458,7 +459,7 @@
           <a:p>
             <a:fld id="{2BACF29F-B6FF-4964-817E-FDF12FC66187}" type="datetimeFigureOut">
               <a:rPr lang="en-US" smtClean="0"/>
-              <a:t>7/10/2015</a:t>
+              <a:t>5/31/2016</a:t>
             </a:fld>
             <a:endParaRPr lang="en-US"/>
           </a:p>
@@ -638,7 +639,7 @@
           <a:p>
             <a:fld id="{2BACF29F-B6FF-4964-817E-FDF12FC66187}" type="datetimeFigureOut">
               <a:rPr lang="en-US" smtClean="0"/>
-              <a:t>7/10/2015</a:t>
+              <a:t>5/31/2016</a:t>
             </a:fld>
             <a:endParaRPr lang="en-US"/>
           </a:p>
@@ -808,7 +809,7 @@
           <a:p>
             <a:fld id="{2BACF29F-B6FF-4964-817E-FDF12FC66187}" type="datetimeFigureOut">
               <a:rPr lang="en-US" smtClean="0"/>
-              <a:t>7/10/2015</a:t>
+              <a:t>5/31/2016</a:t>
             </a:fld>
             <a:endParaRPr lang="en-US"/>
           </a:p>
@@ -1054,7 +1055,7 @@
           <a:p>
             <a:fld id="{2BACF29F-B6FF-4964-817E-FDF12FC66187}" type="datetimeFigureOut">
               <a:rPr lang="en-US" smtClean="0"/>
-              <a:t>7/10/2015</a:t>
+              <a:t>5/31/2016</a:t>
             </a:fld>
             <a:endParaRPr lang="en-US"/>
           </a:p>
@@ -1342,7 +1343,7 @@
           <a:p>
             <a:fld id="{2BACF29F-B6FF-4964-817E-FDF12FC66187}" type="datetimeFigureOut">
               <a:rPr lang="en-US" smtClean="0"/>
-              <a:t>7/10/2015</a:t>
+              <a:t>5/31/2016</a:t>
             </a:fld>
             <a:endParaRPr lang="en-US"/>
           </a:p>
@@ -1764,7 +1765,7 @@
           <a:p>
             <a:fld id="{2BACF29F-B6FF-4964-817E-FDF12FC66187}" type="datetimeFigureOut">
               <a:rPr lang="en-US" smtClean="0"/>
-              <a:t>7/10/2015</a:t>
+              <a:t>5/31/2016</a:t>
             </a:fld>
             <a:endParaRPr lang="en-US"/>
           </a:p>
@@ -1882,7 +1883,7 @@
           <a:p>
             <a:fld id="{2BACF29F-B6FF-4964-817E-FDF12FC66187}" type="datetimeFigureOut">
               <a:rPr lang="en-US" smtClean="0"/>
-              <a:t>7/10/2015</a:t>
+              <a:t>5/31/2016</a:t>
             </a:fld>
             <a:endParaRPr lang="en-US"/>
           </a:p>
@@ -1977,7 +1978,7 @@
           <a:p>
             <a:fld id="{2BACF29F-B6FF-4964-817E-FDF12FC66187}" type="datetimeFigureOut">
               <a:rPr lang="en-US" smtClean="0"/>
-              <a:t>7/10/2015</a:t>
+              <a:t>5/31/2016</a:t>
             </a:fld>
             <a:endParaRPr lang="en-US"/>
           </a:p>
@@ -2254,7 +2255,7 @@
           <a:p>
             <a:fld id="{2BACF29F-B6FF-4964-817E-FDF12FC66187}" type="datetimeFigureOut">
               <a:rPr lang="en-US" smtClean="0"/>
-              <a:t>7/10/2015</a:t>
+              <a:t>5/31/2016</a:t>
             </a:fld>
             <a:endParaRPr lang="en-US"/>
           </a:p>
@@ -2507,7 +2508,7 @@
           <a:p>
             <a:fld id="{2BACF29F-B6FF-4964-817E-FDF12FC66187}" type="datetimeFigureOut">
               <a:rPr lang="en-US" smtClean="0"/>
-              <a:t>7/10/2015</a:t>
+              <a:t>5/31/2016</a:t>
             </a:fld>
             <a:endParaRPr lang="en-US"/>
           </a:p>
@@ -2720,7 +2721,7 @@
           <a:p>
             <a:fld id="{2BACF29F-B6FF-4964-817E-FDF12FC66187}" type="datetimeFigureOut">
               <a:rPr lang="en-US" smtClean="0"/>
-              <a:t>7/10/2015</a:t>
+              <a:t>5/31/2016</a:t>
             </a:fld>
             <a:endParaRPr lang="en-US"/>
           </a:p>
@@ -4628,6 +4629,1849 @@
 </p:sld>
 </file>
 
+<file path=ppt/slides/slide2.xml><?xml version="1.0" encoding="utf-8"?>
+<p:sld xmlns:a="http://schemas.openxmlformats.org/drawingml/2006/main" xmlns:r="http://schemas.openxmlformats.org/officeDocument/2006/relationships" xmlns:p="http://schemas.openxmlformats.org/presentationml/2006/main">
+  <p:cSld>
+    <p:spTree>
+      <p:nvGrpSpPr>
+        <p:cNvPr id="1" name=""/>
+        <p:cNvGrpSpPr/>
+        <p:nvPr/>
+      </p:nvGrpSpPr>
+      <p:grpSpPr>
+        <a:xfrm>
+          <a:off x="0" y="0"/>
+          <a:ext cx="0" cy="0"/>
+          <a:chOff x="0" y="0"/>
+          <a:chExt cx="0" cy="0"/>
+        </a:xfrm>
+      </p:grpSpPr>
+      <p:sp>
+        <p:nvSpPr>
+          <p:cNvPr id="4" name="Rectangle 3"/>
+          <p:cNvSpPr>
+            <a:spLocks noChangeAspect="1"/>
+          </p:cNvSpPr>
+          <p:nvPr/>
+        </p:nvSpPr>
+        <p:spPr>
+          <a:xfrm>
+            <a:off x="1447800" y="1821868"/>
+            <a:ext cx="2995085" cy="2641220"/>
+          </a:xfrm>
+          <a:prstGeom prst="rect">
+            <a:avLst/>
+          </a:prstGeom>
+          <a:noFill/>
+          <a:ln>
+            <a:solidFill>
+              <a:schemeClr val="bg1">
+                <a:lumMod val="65000"/>
+              </a:schemeClr>
+            </a:solidFill>
+          </a:ln>
+        </p:spPr>
+        <p:style>
+          <a:lnRef idx="2">
+            <a:schemeClr val="accent1">
+              <a:shade val="50000"/>
+            </a:schemeClr>
+          </a:lnRef>
+          <a:fillRef idx="1">
+            <a:schemeClr val="accent1"/>
+          </a:fillRef>
+          <a:effectRef idx="0">
+            <a:schemeClr val="accent1"/>
+          </a:effectRef>
+          <a:fontRef idx="minor">
+            <a:schemeClr val="lt1"/>
+          </a:fontRef>
+        </p:style>
+        <p:txBody>
+          <a:bodyPr tIns="91440" rtlCol="0" anchor="t" anchorCtr="0"/>
+          <a:lstStyle/>
+          <a:p>
+            <a:pPr algn="ctr"/>
+            <a:r>
+              <a:rPr lang="en-US" dirty="0" smtClean="0">
+                <a:solidFill>
+                  <a:schemeClr val="tx1"/>
+                </a:solidFill>
+                <a:latin typeface="Lucida Bright" panose="02040602050505020304" pitchFamily="18" charset="0"/>
+              </a:rPr>
+              <a:t>Time discretization</a:t>
+            </a:r>
+            <a:endParaRPr lang="en-US" dirty="0">
+              <a:solidFill>
+                <a:schemeClr val="tx1"/>
+              </a:solidFill>
+              <a:latin typeface="Lucida Bright" panose="02040602050505020304" pitchFamily="18" charset="0"/>
+            </a:endParaRPr>
+          </a:p>
+        </p:txBody>
+      </p:sp>
+      <p:sp>
+        <p:nvSpPr>
+          <p:cNvPr id="5" name="Rectangle 4"/>
+          <p:cNvSpPr/>
+          <p:nvPr/>
+        </p:nvSpPr>
+        <p:spPr>
+          <a:xfrm>
+            <a:off x="1143000" y="1113905"/>
+            <a:ext cx="3638550" cy="3657600"/>
+          </a:xfrm>
+          <a:prstGeom prst="rect">
+            <a:avLst/>
+          </a:prstGeom>
+          <a:noFill/>
+          <a:ln>
+            <a:solidFill>
+              <a:schemeClr val="bg1">
+                <a:lumMod val="65000"/>
+              </a:schemeClr>
+            </a:solidFill>
+          </a:ln>
+        </p:spPr>
+        <p:style>
+          <a:lnRef idx="2">
+            <a:schemeClr val="accent1">
+              <a:shade val="50000"/>
+            </a:schemeClr>
+          </a:lnRef>
+          <a:fillRef idx="1">
+            <a:schemeClr val="accent1"/>
+          </a:fillRef>
+          <a:effectRef idx="0">
+            <a:schemeClr val="accent1"/>
+          </a:effectRef>
+          <a:fontRef idx="minor">
+            <a:schemeClr val="lt1"/>
+          </a:fontRef>
+        </p:style>
+        <p:txBody>
+          <a:bodyPr tIns="91440" rtlCol="0" anchor="t" anchorCtr="0"/>
+          <a:lstStyle/>
+          <a:p>
+            <a:pPr algn="ctr"/>
+            <a:r>
+              <a:rPr lang="en-US" dirty="0" smtClean="0">
+                <a:solidFill>
+                  <a:schemeClr val="tx1"/>
+                </a:solidFill>
+                <a:latin typeface="Lucida Bright" panose="02040602050505020304" pitchFamily="18" charset="0"/>
+              </a:rPr>
+              <a:t>Residual</a:t>
+            </a:r>
+            <a:endParaRPr lang="en-US" dirty="0">
+              <a:solidFill>
+                <a:schemeClr val="tx1"/>
+              </a:solidFill>
+              <a:latin typeface="Lucida Bright" panose="02040602050505020304" pitchFamily="18" charset="0"/>
+            </a:endParaRPr>
+          </a:p>
+        </p:txBody>
+      </p:sp>
+      <p:sp>
+        <p:nvSpPr>
+          <p:cNvPr id="6" name="Rectangle 5"/>
+          <p:cNvSpPr>
+            <a:spLocks noChangeAspect="1"/>
+          </p:cNvSpPr>
+          <p:nvPr/>
+        </p:nvSpPr>
+        <p:spPr>
+          <a:xfrm>
+            <a:off x="1676399" y="2607833"/>
+            <a:ext cx="2580053" cy="1596076"/>
+          </a:xfrm>
+          <a:prstGeom prst="rect">
+            <a:avLst/>
+          </a:prstGeom>
+          <a:noFill/>
+          <a:ln>
+            <a:solidFill>
+              <a:schemeClr val="bg1">
+                <a:lumMod val="65000"/>
+              </a:schemeClr>
+            </a:solidFill>
+          </a:ln>
+        </p:spPr>
+        <p:style>
+          <a:lnRef idx="2">
+            <a:schemeClr val="accent1">
+              <a:shade val="50000"/>
+            </a:schemeClr>
+          </a:lnRef>
+          <a:fillRef idx="1">
+            <a:schemeClr val="accent1"/>
+          </a:fillRef>
+          <a:effectRef idx="0">
+            <a:schemeClr val="accent1"/>
+          </a:effectRef>
+          <a:fontRef idx="minor">
+            <a:schemeClr val="lt1"/>
+          </a:fontRef>
+        </p:style>
+        <p:txBody>
+          <a:bodyPr tIns="91440" rtlCol="0" anchor="t" anchorCtr="0"/>
+          <a:lstStyle/>
+          <a:p>
+            <a:pPr algn="ctr"/>
+            <a:r>
+              <a:rPr lang="en-US" dirty="0" smtClean="0">
+                <a:solidFill>
+                  <a:schemeClr val="tx1"/>
+                </a:solidFill>
+                <a:latin typeface="Lucida Bright" panose="02040602050505020304" pitchFamily="18" charset="0"/>
+              </a:rPr>
+              <a:t>Space discretization</a:t>
+            </a:r>
+            <a:endParaRPr lang="en-US" dirty="0">
+              <a:solidFill>
+                <a:schemeClr val="tx1"/>
+              </a:solidFill>
+              <a:latin typeface="Lucida Bright" panose="02040602050505020304" pitchFamily="18" charset="0"/>
+            </a:endParaRPr>
+          </a:p>
+        </p:txBody>
+      </p:sp>
+      <p:sp>
+        <p:nvSpPr>
+          <p:cNvPr id="7" name="Rectangle 6"/>
+          <p:cNvSpPr>
+            <a:spLocks noChangeAspect="1"/>
+          </p:cNvSpPr>
+          <p:nvPr/>
+        </p:nvSpPr>
+        <p:spPr>
+          <a:xfrm>
+            <a:off x="1969338" y="3311741"/>
+            <a:ext cx="1905000" cy="632729"/>
+          </a:xfrm>
+          <a:prstGeom prst="rect">
+            <a:avLst/>
+          </a:prstGeom>
+          <a:noFill/>
+          <a:ln>
+            <a:solidFill>
+              <a:schemeClr val="bg1">
+                <a:lumMod val="65000"/>
+              </a:schemeClr>
+            </a:solidFill>
+          </a:ln>
+        </p:spPr>
+        <p:style>
+          <a:lnRef idx="2">
+            <a:schemeClr val="accent1">
+              <a:shade val="50000"/>
+            </a:schemeClr>
+          </a:lnRef>
+          <a:fillRef idx="1">
+            <a:schemeClr val="accent1"/>
+          </a:fillRef>
+          <a:effectRef idx="0">
+            <a:schemeClr val="accent1"/>
+          </a:effectRef>
+          <a:fontRef idx="minor">
+            <a:schemeClr val="lt1"/>
+          </a:fontRef>
+        </p:style>
+        <p:txBody>
+          <a:bodyPr tIns="45720" rtlCol="0" anchor="ctr" anchorCtr="0"/>
+          <a:lstStyle/>
+          <a:p>
+            <a:pPr algn="ctr"/>
+            <a:r>
+              <a:rPr lang="en-US" dirty="0" smtClean="0">
+                <a:solidFill>
+                  <a:schemeClr val="tx1"/>
+                </a:solidFill>
+                <a:latin typeface="Lucida Bright" panose="02040602050505020304" pitchFamily="18" charset="0"/>
+              </a:rPr>
+              <a:t>Model</a:t>
+            </a:r>
+            <a:endParaRPr lang="en-US" dirty="0">
+              <a:solidFill>
+                <a:schemeClr val="tx1"/>
+              </a:solidFill>
+              <a:latin typeface="Lucida Bright" panose="02040602050505020304" pitchFamily="18" charset="0"/>
+            </a:endParaRPr>
+          </a:p>
+        </p:txBody>
+      </p:sp>
+      <p:sp>
+        <p:nvSpPr>
+          <p:cNvPr id="73" name="Rectangle 72"/>
+          <p:cNvSpPr/>
+          <p:nvPr/>
+        </p:nvSpPr>
+        <p:spPr>
+          <a:xfrm>
+            <a:off x="685800" y="381000"/>
+            <a:ext cx="7772400" cy="5029200"/>
+          </a:xfrm>
+          <a:prstGeom prst="rect">
+            <a:avLst/>
+          </a:prstGeom>
+          <a:noFill/>
+          <a:ln>
+            <a:solidFill>
+              <a:schemeClr val="bg1">
+                <a:lumMod val="65000"/>
+              </a:schemeClr>
+            </a:solidFill>
+          </a:ln>
+        </p:spPr>
+        <p:style>
+          <a:lnRef idx="2">
+            <a:schemeClr val="accent1">
+              <a:shade val="50000"/>
+            </a:schemeClr>
+          </a:lnRef>
+          <a:fillRef idx="1">
+            <a:schemeClr val="accent1"/>
+          </a:fillRef>
+          <a:effectRef idx="0">
+            <a:schemeClr val="accent1"/>
+          </a:effectRef>
+          <a:fontRef idx="minor">
+            <a:schemeClr val="lt1"/>
+          </a:fontRef>
+        </p:style>
+        <p:txBody>
+          <a:bodyPr lIns="91440" tIns="45720" rIns="91440" rtlCol="0" anchor="t" anchorCtr="0"/>
+          <a:lstStyle/>
+          <a:p>
+            <a:pPr algn="ctr"/>
+            <a:r>
+              <a:rPr lang="en-US" dirty="0" smtClean="0">
+                <a:solidFill>
+                  <a:schemeClr val="tx1"/>
+                </a:solidFill>
+                <a:latin typeface="Lucida Bright" panose="02040602050505020304" pitchFamily="18" charset="0"/>
+              </a:rPr>
+              <a:t>Simulation</a:t>
+            </a:r>
+            <a:endParaRPr lang="en-US" dirty="0">
+              <a:solidFill>
+                <a:schemeClr val="tx1"/>
+              </a:solidFill>
+              <a:latin typeface="Lucida Bright" panose="02040602050505020304" pitchFamily="18" charset="0"/>
+            </a:endParaRPr>
+          </a:p>
+        </p:txBody>
+      </p:sp>
+      <p:cxnSp>
+        <p:nvCxnSpPr>
+          <p:cNvPr id="101" name="Straight Connector 100"/>
+          <p:cNvCxnSpPr/>
+          <p:nvPr/>
+        </p:nvCxnSpPr>
+        <p:spPr>
+          <a:xfrm>
+            <a:off x="5105372" y="1433945"/>
+            <a:ext cx="28" cy="2156420"/>
+          </a:xfrm>
+          <a:prstGeom prst="line">
+            <a:avLst/>
+          </a:prstGeom>
+          <a:ln w="19050">
+            <a:solidFill>
+              <a:schemeClr val="tx1"/>
+            </a:solidFill>
+          </a:ln>
+        </p:spPr>
+        <p:style>
+          <a:lnRef idx="1">
+            <a:schemeClr val="accent1"/>
+          </a:lnRef>
+          <a:fillRef idx="0">
+            <a:schemeClr val="accent1"/>
+          </a:fillRef>
+          <a:effectRef idx="0">
+            <a:schemeClr val="accent1"/>
+          </a:effectRef>
+          <a:fontRef idx="minor">
+            <a:schemeClr val="tx1"/>
+          </a:fontRef>
+        </p:style>
+      </p:cxnSp>
+      <p:cxnSp>
+        <p:nvCxnSpPr>
+          <p:cNvPr id="103" name="Straight Arrow Connector 102"/>
+          <p:cNvCxnSpPr/>
+          <p:nvPr/>
+        </p:nvCxnSpPr>
+        <p:spPr>
+          <a:xfrm flipH="1">
+            <a:off x="4800600" y="2570804"/>
+            <a:ext cx="304800" cy="0"/>
+          </a:xfrm>
+          <a:prstGeom prst="straightConnector1">
+            <a:avLst/>
+          </a:prstGeom>
+          <a:ln w="19050">
+            <a:solidFill>
+              <a:schemeClr val="tx1"/>
+            </a:solidFill>
+            <a:tailEnd type="oval"/>
+          </a:ln>
+        </p:spPr>
+        <p:style>
+          <a:lnRef idx="1">
+            <a:schemeClr val="accent1"/>
+          </a:lnRef>
+          <a:fillRef idx="0">
+            <a:schemeClr val="accent1"/>
+          </a:fillRef>
+          <a:effectRef idx="0">
+            <a:schemeClr val="accent1"/>
+          </a:effectRef>
+          <a:fontRef idx="minor">
+            <a:schemeClr val="tx1"/>
+          </a:fontRef>
+        </p:style>
+      </p:cxnSp>
+      <p:grpSp>
+        <p:nvGrpSpPr>
+          <p:cNvPr id="10" name="Group 9"/>
+          <p:cNvGrpSpPr/>
+          <p:nvPr/>
+        </p:nvGrpSpPr>
+        <p:grpSpPr>
+          <a:xfrm>
+            <a:off x="5410200" y="1113905"/>
+            <a:ext cx="2476470" cy="640080"/>
+            <a:chOff x="5676930" y="939693"/>
+            <a:chExt cx="2476470" cy="777240"/>
+          </a:xfrm>
+        </p:grpSpPr>
+        <p:sp>
+          <p:nvSpPr>
+            <p:cNvPr id="83" name="Rectangle 82"/>
+            <p:cNvSpPr/>
+            <p:nvPr/>
+          </p:nvSpPr>
+          <p:spPr>
+            <a:xfrm>
+              <a:off x="5676930" y="939693"/>
+              <a:ext cx="2476470" cy="777240"/>
+            </a:xfrm>
+            <a:prstGeom prst="rect">
+              <a:avLst/>
+            </a:prstGeom>
+            <a:noFill/>
+            <a:ln>
+              <a:solidFill>
+                <a:schemeClr val="bg1">
+                  <a:lumMod val="65000"/>
+                </a:schemeClr>
+              </a:solidFill>
+            </a:ln>
+          </p:spPr>
+          <p:style>
+            <a:lnRef idx="2">
+              <a:schemeClr val="accent1">
+                <a:shade val="50000"/>
+              </a:schemeClr>
+            </a:lnRef>
+            <a:fillRef idx="1">
+              <a:schemeClr val="accent1"/>
+            </a:fillRef>
+            <a:effectRef idx="0">
+              <a:schemeClr val="accent1"/>
+            </a:effectRef>
+            <a:fontRef idx="minor">
+              <a:schemeClr val="lt1"/>
+            </a:fontRef>
+          </p:style>
+          <p:txBody>
+            <a:bodyPr lIns="731520" tIns="45720" rIns="91440" rtlCol="0" anchor="ctr" anchorCtr="0"/>
+            <a:lstStyle/>
+            <a:p>
+              <a:endParaRPr lang="en-US" dirty="0">
+                <a:solidFill>
+                  <a:schemeClr val="tx1"/>
+                </a:solidFill>
+                <a:latin typeface="Lucida Bright" panose="02040602050505020304" pitchFamily="18" charset="0"/>
+              </a:endParaRPr>
+            </a:p>
+          </p:txBody>
+        </p:sp>
+        <p:sp>
+          <p:nvSpPr>
+            <p:cNvPr id="85" name="Rectangle 84"/>
+            <p:cNvSpPr/>
+            <p:nvPr/>
+          </p:nvSpPr>
+          <p:spPr>
+            <a:xfrm>
+              <a:off x="5786658" y="1214775"/>
+              <a:ext cx="228600" cy="228600"/>
+            </a:xfrm>
+            <a:prstGeom prst="rect">
+              <a:avLst/>
+            </a:prstGeom>
+            <a:noFill/>
+            <a:ln>
+              <a:solidFill>
+                <a:schemeClr val="bg1">
+                  <a:lumMod val="65000"/>
+                </a:schemeClr>
+              </a:solidFill>
+            </a:ln>
+          </p:spPr>
+          <p:style>
+            <a:lnRef idx="2">
+              <a:schemeClr val="accent1">
+                <a:shade val="50000"/>
+              </a:schemeClr>
+            </a:lnRef>
+            <a:fillRef idx="1">
+              <a:schemeClr val="accent1"/>
+            </a:fillRef>
+            <a:effectRef idx="0">
+              <a:schemeClr val="accent1"/>
+            </a:effectRef>
+            <a:fontRef idx="minor">
+              <a:schemeClr val="lt1"/>
+            </a:fontRef>
+          </p:style>
+          <p:txBody>
+            <a:bodyPr lIns="731520" tIns="45720" rIns="91440" rtlCol="0" anchor="ctr" anchorCtr="0"/>
+            <a:lstStyle/>
+            <a:p>
+              <a:endParaRPr lang="en-US" dirty="0">
+                <a:solidFill>
+                  <a:schemeClr val="tx1"/>
+                </a:solidFill>
+                <a:latin typeface="Lucida Bright" panose="02040602050505020304" pitchFamily="18" charset="0"/>
+              </a:endParaRPr>
+            </a:p>
+          </p:txBody>
+        </p:sp>
+        <p:sp>
+          <p:nvSpPr>
+            <p:cNvPr id="110" name="Rectangle 109"/>
+            <p:cNvSpPr/>
+            <p:nvPr/>
+          </p:nvSpPr>
+          <p:spPr>
+            <a:xfrm>
+              <a:off x="6015258" y="939693"/>
+              <a:ext cx="2138142" cy="777240"/>
+            </a:xfrm>
+            <a:prstGeom prst="rect">
+              <a:avLst/>
+            </a:prstGeom>
+            <a:noFill/>
+            <a:ln>
+              <a:noFill/>
+            </a:ln>
+          </p:spPr>
+          <p:style>
+            <a:lnRef idx="2">
+              <a:schemeClr val="accent1">
+                <a:shade val="50000"/>
+              </a:schemeClr>
+            </a:lnRef>
+            <a:fillRef idx="1">
+              <a:schemeClr val="accent1"/>
+            </a:fillRef>
+            <a:effectRef idx="0">
+              <a:schemeClr val="accent1"/>
+            </a:effectRef>
+            <a:fontRef idx="minor">
+              <a:schemeClr val="lt1"/>
+            </a:fontRef>
+          </p:style>
+          <p:txBody>
+            <a:bodyPr lIns="91440" tIns="45720" rIns="91440" rtlCol="0" anchor="ctr" anchorCtr="0"/>
+            <a:lstStyle/>
+            <a:p>
+              <a:pPr algn="ctr"/>
+              <a:r>
+                <a:rPr lang="en-US" dirty="0" smtClean="0">
+                  <a:solidFill>
+                    <a:schemeClr val="tx1"/>
+                  </a:solidFill>
+                  <a:latin typeface="Lucida Bright" panose="02040602050505020304" pitchFamily="18" charset="0"/>
+                </a:rPr>
+                <a:t>Preconditioner</a:t>
+              </a:r>
+              <a:endParaRPr lang="en-US" dirty="0">
+                <a:solidFill>
+                  <a:schemeClr val="tx1"/>
+                </a:solidFill>
+                <a:latin typeface="Lucida Bright" panose="02040602050505020304" pitchFamily="18" charset="0"/>
+              </a:endParaRPr>
+            </a:p>
+          </p:txBody>
+        </p:sp>
+        <p:sp>
+          <p:nvSpPr>
+            <p:cNvPr id="119" name="Rectangle 118"/>
+            <p:cNvSpPr/>
+            <p:nvPr/>
+          </p:nvSpPr>
+          <p:spPr>
+            <a:xfrm>
+              <a:off x="5786658" y="1214775"/>
+              <a:ext cx="228586" cy="123444"/>
+            </a:xfrm>
+            <a:prstGeom prst="rect">
+              <a:avLst/>
+            </a:prstGeom>
+            <a:noFill/>
+            <a:ln>
+              <a:noFill/>
+            </a:ln>
+          </p:spPr>
+          <p:style>
+            <a:lnRef idx="2">
+              <a:schemeClr val="accent1">
+                <a:shade val="50000"/>
+              </a:schemeClr>
+            </a:lnRef>
+            <a:fillRef idx="1">
+              <a:schemeClr val="accent1"/>
+            </a:fillRef>
+            <a:effectRef idx="0">
+              <a:schemeClr val="accent1"/>
+            </a:effectRef>
+            <a:fontRef idx="minor">
+              <a:schemeClr val="lt1"/>
+            </a:fontRef>
+          </p:style>
+          <p:txBody>
+            <a:bodyPr lIns="731520" tIns="45720" rIns="91440" rtlCol="0" anchor="ctr" anchorCtr="0"/>
+            <a:lstStyle/>
+            <a:p>
+              <a:endParaRPr lang="en-US" dirty="0">
+                <a:solidFill>
+                  <a:schemeClr val="tx1"/>
+                </a:solidFill>
+                <a:latin typeface="Lucida Bright" panose="02040602050505020304" pitchFamily="18" charset="0"/>
+              </a:endParaRPr>
+            </a:p>
+          </p:txBody>
+        </p:sp>
+      </p:grpSp>
+      <p:grpSp>
+        <p:nvGrpSpPr>
+          <p:cNvPr id="11" name="Group 10"/>
+          <p:cNvGrpSpPr/>
+          <p:nvPr/>
+        </p:nvGrpSpPr>
+        <p:grpSpPr>
+          <a:xfrm>
+            <a:off x="5410200" y="2121408"/>
+            <a:ext cx="2476470" cy="640080"/>
+            <a:chOff x="5676916" y="2075073"/>
+            <a:chExt cx="2476470" cy="777240"/>
+          </a:xfrm>
+        </p:grpSpPr>
+        <p:sp>
+          <p:nvSpPr>
+            <p:cNvPr id="78" name="Rectangle 77"/>
+            <p:cNvSpPr/>
+            <p:nvPr/>
+          </p:nvSpPr>
+          <p:spPr>
+            <a:xfrm>
+              <a:off x="5676916" y="2075073"/>
+              <a:ext cx="2476470" cy="777240"/>
+            </a:xfrm>
+            <a:prstGeom prst="rect">
+              <a:avLst/>
+            </a:prstGeom>
+            <a:noFill/>
+            <a:ln>
+              <a:solidFill>
+                <a:schemeClr val="bg1">
+                  <a:lumMod val="65000"/>
+                </a:schemeClr>
+              </a:solidFill>
+            </a:ln>
+          </p:spPr>
+          <p:style>
+            <a:lnRef idx="2">
+              <a:schemeClr val="accent1">
+                <a:shade val="50000"/>
+              </a:schemeClr>
+            </a:lnRef>
+            <a:fillRef idx="1">
+              <a:schemeClr val="accent1"/>
+            </a:fillRef>
+            <a:effectRef idx="0">
+              <a:schemeClr val="accent1"/>
+            </a:effectRef>
+            <a:fontRef idx="minor">
+              <a:schemeClr val="lt1"/>
+            </a:fontRef>
+          </p:style>
+          <p:txBody>
+            <a:bodyPr lIns="1005840" tIns="45720" rIns="91440" rtlCol="0" anchor="ctr" anchorCtr="0"/>
+            <a:lstStyle/>
+            <a:p>
+              <a:endParaRPr lang="en-US" dirty="0">
+                <a:solidFill>
+                  <a:schemeClr val="tx1"/>
+                </a:solidFill>
+                <a:latin typeface="Lucida Bright" panose="02040602050505020304" pitchFamily="18" charset="0"/>
+              </a:endParaRPr>
+            </a:p>
+          </p:txBody>
+        </p:sp>
+        <p:sp>
+          <p:nvSpPr>
+            <p:cNvPr id="79" name="Rectangle 78"/>
+            <p:cNvSpPr/>
+            <p:nvPr/>
+          </p:nvSpPr>
+          <p:spPr>
+            <a:xfrm>
+              <a:off x="5786644" y="2184801"/>
+              <a:ext cx="228600" cy="228600"/>
+            </a:xfrm>
+            <a:prstGeom prst="rect">
+              <a:avLst/>
+            </a:prstGeom>
+            <a:noFill/>
+            <a:ln>
+              <a:solidFill>
+                <a:schemeClr val="bg1">
+                  <a:lumMod val="65000"/>
+                </a:schemeClr>
+              </a:solidFill>
+            </a:ln>
+          </p:spPr>
+          <p:style>
+            <a:lnRef idx="2">
+              <a:schemeClr val="accent1">
+                <a:shade val="50000"/>
+              </a:schemeClr>
+            </a:lnRef>
+            <a:fillRef idx="1">
+              <a:schemeClr val="accent1"/>
+            </a:fillRef>
+            <a:effectRef idx="0">
+              <a:schemeClr val="accent1"/>
+            </a:effectRef>
+            <a:fontRef idx="minor">
+              <a:schemeClr val="lt1"/>
+            </a:fontRef>
+          </p:style>
+          <p:txBody>
+            <a:bodyPr lIns="731520" tIns="45720" rIns="91440" rtlCol="0" anchor="ctr" anchorCtr="0"/>
+            <a:lstStyle/>
+            <a:p>
+              <a:endParaRPr lang="en-US" dirty="0">
+                <a:solidFill>
+                  <a:schemeClr val="tx1"/>
+                </a:solidFill>
+                <a:latin typeface="Lucida Bright" panose="02040602050505020304" pitchFamily="18" charset="0"/>
+              </a:endParaRPr>
+            </a:p>
+          </p:txBody>
+        </p:sp>
+        <p:sp>
+          <p:nvSpPr>
+            <p:cNvPr id="80" name="Rectangle 79"/>
+            <p:cNvSpPr/>
+            <p:nvPr/>
+          </p:nvSpPr>
+          <p:spPr>
+            <a:xfrm>
+              <a:off x="5786644" y="2513985"/>
+              <a:ext cx="228600" cy="228600"/>
+            </a:xfrm>
+            <a:prstGeom prst="rect">
+              <a:avLst/>
+            </a:prstGeom>
+            <a:noFill/>
+            <a:ln>
+              <a:solidFill>
+                <a:schemeClr val="bg1">
+                  <a:lumMod val="65000"/>
+                </a:schemeClr>
+              </a:solidFill>
+            </a:ln>
+          </p:spPr>
+          <p:style>
+            <a:lnRef idx="2">
+              <a:schemeClr val="accent1">
+                <a:shade val="50000"/>
+              </a:schemeClr>
+            </a:lnRef>
+            <a:fillRef idx="1">
+              <a:schemeClr val="accent1"/>
+            </a:fillRef>
+            <a:effectRef idx="0">
+              <a:schemeClr val="accent1"/>
+            </a:effectRef>
+            <a:fontRef idx="minor">
+              <a:schemeClr val="lt1"/>
+            </a:fontRef>
+          </p:style>
+          <p:txBody>
+            <a:bodyPr lIns="731520" tIns="45720" rIns="91440" rtlCol="0" anchor="ctr" anchorCtr="0"/>
+            <a:lstStyle/>
+            <a:p>
+              <a:endParaRPr lang="en-US" dirty="0">
+                <a:solidFill>
+                  <a:schemeClr val="tx1"/>
+                </a:solidFill>
+                <a:latin typeface="Lucida Bright" panose="02040602050505020304" pitchFamily="18" charset="0"/>
+              </a:endParaRPr>
+            </a:p>
+          </p:txBody>
+        </p:sp>
+        <p:sp>
+          <p:nvSpPr>
+            <p:cNvPr id="81" name="Oval 80"/>
+            <p:cNvSpPr/>
+            <p:nvPr/>
+          </p:nvSpPr>
+          <p:spPr>
+            <a:xfrm flipH="1" flipV="1">
+              <a:off x="5896372" y="2623713"/>
+              <a:ext cx="9144" cy="9144"/>
+            </a:xfrm>
+            <a:prstGeom prst="ellipse">
+              <a:avLst/>
+            </a:prstGeom>
+            <a:noFill/>
+            <a:ln w="0">
+              <a:solidFill>
+                <a:schemeClr val="bg1"/>
+              </a:solidFill>
+            </a:ln>
+          </p:spPr>
+          <p:style>
+            <a:lnRef idx="2">
+              <a:schemeClr val="accent1">
+                <a:shade val="50000"/>
+              </a:schemeClr>
+            </a:lnRef>
+            <a:fillRef idx="1">
+              <a:schemeClr val="accent1"/>
+            </a:fillRef>
+            <a:effectRef idx="0">
+              <a:schemeClr val="accent1"/>
+            </a:effectRef>
+            <a:fontRef idx="minor">
+              <a:schemeClr val="lt1"/>
+            </a:fontRef>
+          </p:style>
+          <p:txBody>
+            <a:bodyPr rtlCol="0" anchor="ctr"/>
+            <a:lstStyle/>
+            <a:p>
+              <a:pPr algn="ctr"/>
+              <a:endParaRPr lang="en-US"/>
+            </a:p>
+          </p:txBody>
+        </p:sp>
+        <p:sp>
+          <p:nvSpPr>
+            <p:cNvPr id="82" name="Oval 81"/>
+            <p:cNvSpPr/>
+            <p:nvPr/>
+          </p:nvSpPr>
+          <p:spPr>
+            <a:xfrm flipH="1" flipV="1">
+              <a:off x="5896372" y="2294529"/>
+              <a:ext cx="9144" cy="9144"/>
+            </a:xfrm>
+            <a:prstGeom prst="ellipse">
+              <a:avLst/>
+            </a:prstGeom>
+            <a:noFill/>
+            <a:ln w="0">
+              <a:solidFill>
+                <a:schemeClr val="bg1"/>
+              </a:solidFill>
+            </a:ln>
+          </p:spPr>
+          <p:style>
+            <a:lnRef idx="2">
+              <a:schemeClr val="accent1">
+                <a:shade val="50000"/>
+              </a:schemeClr>
+            </a:lnRef>
+            <a:fillRef idx="1">
+              <a:schemeClr val="accent1"/>
+            </a:fillRef>
+            <a:effectRef idx="0">
+              <a:schemeClr val="accent1"/>
+            </a:effectRef>
+            <a:fontRef idx="minor">
+              <a:schemeClr val="lt1"/>
+            </a:fontRef>
+          </p:style>
+          <p:txBody>
+            <a:bodyPr rtlCol="0" anchor="ctr"/>
+            <a:lstStyle/>
+            <a:p>
+              <a:pPr algn="ctr"/>
+              <a:endParaRPr lang="en-US"/>
+            </a:p>
+          </p:txBody>
+        </p:sp>
+        <p:sp>
+          <p:nvSpPr>
+            <p:cNvPr id="113" name="Rectangle 112"/>
+            <p:cNvSpPr/>
+            <p:nvPr/>
+          </p:nvSpPr>
+          <p:spPr>
+            <a:xfrm>
+              <a:off x="6015244" y="2075073"/>
+              <a:ext cx="2138142" cy="777240"/>
+            </a:xfrm>
+            <a:prstGeom prst="rect">
+              <a:avLst/>
+            </a:prstGeom>
+            <a:noFill/>
+            <a:ln>
+              <a:noFill/>
+            </a:ln>
+          </p:spPr>
+          <p:style>
+            <a:lnRef idx="2">
+              <a:schemeClr val="accent1">
+                <a:shade val="50000"/>
+              </a:schemeClr>
+            </a:lnRef>
+            <a:fillRef idx="1">
+              <a:schemeClr val="accent1"/>
+            </a:fillRef>
+            <a:effectRef idx="0">
+              <a:schemeClr val="accent1"/>
+            </a:effectRef>
+            <a:fontRef idx="minor">
+              <a:schemeClr val="lt1"/>
+            </a:fontRef>
+          </p:style>
+          <p:txBody>
+            <a:bodyPr lIns="91440" tIns="45720" rIns="91440" rtlCol="0" anchor="ctr" anchorCtr="0"/>
+            <a:lstStyle/>
+            <a:p>
+              <a:pPr algn="ctr"/>
+              <a:r>
+                <a:rPr lang="en-US" dirty="0" smtClean="0">
+                  <a:solidFill>
+                    <a:schemeClr val="tx1"/>
+                  </a:solidFill>
+                  <a:latin typeface="Lucida Bright" panose="02040602050505020304" pitchFamily="18" charset="0"/>
+                </a:rPr>
+                <a:t>Solver</a:t>
+              </a:r>
+              <a:endParaRPr lang="en-US" dirty="0">
+                <a:solidFill>
+                  <a:schemeClr val="tx1"/>
+                </a:solidFill>
+                <a:latin typeface="Lucida Bright" panose="02040602050505020304" pitchFamily="18" charset="0"/>
+              </a:endParaRPr>
+            </a:p>
+          </p:txBody>
+        </p:sp>
+        <p:sp>
+          <p:nvSpPr>
+            <p:cNvPr id="124" name="Rectangle 123"/>
+            <p:cNvSpPr/>
+            <p:nvPr/>
+          </p:nvSpPr>
+          <p:spPr>
+            <a:xfrm>
+              <a:off x="5786658" y="2184801"/>
+              <a:ext cx="228586" cy="123444"/>
+            </a:xfrm>
+            <a:prstGeom prst="rect">
+              <a:avLst/>
+            </a:prstGeom>
+            <a:noFill/>
+            <a:ln>
+              <a:noFill/>
+            </a:ln>
+          </p:spPr>
+          <p:style>
+            <a:lnRef idx="2">
+              <a:schemeClr val="accent1">
+                <a:shade val="50000"/>
+              </a:schemeClr>
+            </a:lnRef>
+            <a:fillRef idx="1">
+              <a:schemeClr val="accent1"/>
+            </a:fillRef>
+            <a:effectRef idx="0">
+              <a:schemeClr val="accent1"/>
+            </a:effectRef>
+            <a:fontRef idx="minor">
+              <a:schemeClr val="lt1"/>
+            </a:fontRef>
+          </p:style>
+          <p:txBody>
+            <a:bodyPr lIns="731520" tIns="45720" rIns="91440" rtlCol="0" anchor="ctr" anchorCtr="0"/>
+            <a:lstStyle/>
+            <a:p>
+              <a:endParaRPr lang="en-US" dirty="0">
+                <a:solidFill>
+                  <a:schemeClr val="tx1"/>
+                </a:solidFill>
+                <a:latin typeface="Lucida Bright" panose="02040602050505020304" pitchFamily="18" charset="0"/>
+              </a:endParaRPr>
+            </a:p>
+          </p:txBody>
+        </p:sp>
+        <p:sp>
+          <p:nvSpPr>
+            <p:cNvPr id="127" name="Rectangle 126"/>
+            <p:cNvSpPr/>
+            <p:nvPr/>
+          </p:nvSpPr>
+          <p:spPr>
+            <a:xfrm>
+              <a:off x="5786658" y="2513985"/>
+              <a:ext cx="228586" cy="123444"/>
+            </a:xfrm>
+            <a:prstGeom prst="rect">
+              <a:avLst/>
+            </a:prstGeom>
+            <a:noFill/>
+            <a:ln>
+              <a:noFill/>
+            </a:ln>
+          </p:spPr>
+          <p:style>
+            <a:lnRef idx="2">
+              <a:schemeClr val="accent1">
+                <a:shade val="50000"/>
+              </a:schemeClr>
+            </a:lnRef>
+            <a:fillRef idx="1">
+              <a:schemeClr val="accent1"/>
+            </a:fillRef>
+            <a:effectRef idx="0">
+              <a:schemeClr val="accent1"/>
+            </a:effectRef>
+            <a:fontRef idx="minor">
+              <a:schemeClr val="lt1"/>
+            </a:fontRef>
+          </p:style>
+          <p:txBody>
+            <a:bodyPr lIns="731520" tIns="45720" rIns="91440" rtlCol="0" anchor="ctr" anchorCtr="0"/>
+            <a:lstStyle/>
+            <a:p>
+              <a:endParaRPr lang="en-US" dirty="0">
+                <a:solidFill>
+                  <a:schemeClr val="tx1"/>
+                </a:solidFill>
+                <a:latin typeface="Lucida Bright" panose="02040602050505020304" pitchFamily="18" charset="0"/>
+              </a:endParaRPr>
+            </a:p>
+          </p:txBody>
+        </p:sp>
+      </p:grpSp>
+      <p:grpSp>
+        <p:nvGrpSpPr>
+          <p:cNvPr id="12" name="Group 11"/>
+          <p:cNvGrpSpPr/>
+          <p:nvPr/>
+        </p:nvGrpSpPr>
+        <p:grpSpPr>
+          <a:xfrm>
+            <a:off x="5410214" y="3127248"/>
+            <a:ext cx="2476470" cy="640080"/>
+            <a:chOff x="5676930" y="3210453"/>
+            <a:chExt cx="2476470" cy="777240"/>
+          </a:xfrm>
+        </p:grpSpPr>
+        <p:sp>
+          <p:nvSpPr>
+            <p:cNvPr id="14" name="Rectangle 13"/>
+            <p:cNvSpPr/>
+            <p:nvPr/>
+          </p:nvSpPr>
+          <p:spPr>
+            <a:xfrm>
+              <a:off x="5676930" y="3210453"/>
+              <a:ext cx="2476470" cy="777240"/>
+            </a:xfrm>
+            <a:prstGeom prst="rect">
+              <a:avLst/>
+            </a:prstGeom>
+            <a:noFill/>
+            <a:ln>
+              <a:solidFill>
+                <a:schemeClr val="bg1">
+                  <a:lumMod val="65000"/>
+                </a:schemeClr>
+              </a:solidFill>
+            </a:ln>
+          </p:spPr>
+          <p:style>
+            <a:lnRef idx="2">
+              <a:schemeClr val="accent1">
+                <a:shade val="50000"/>
+              </a:schemeClr>
+            </a:lnRef>
+            <a:fillRef idx="1">
+              <a:schemeClr val="accent1"/>
+            </a:fillRef>
+            <a:effectRef idx="0">
+              <a:schemeClr val="accent1"/>
+            </a:effectRef>
+            <a:fontRef idx="minor">
+              <a:schemeClr val="lt1"/>
+            </a:fontRef>
+          </p:style>
+          <p:txBody>
+            <a:bodyPr lIns="731520" tIns="45720" rIns="91440" rtlCol="0" anchor="ctr" anchorCtr="0"/>
+            <a:lstStyle/>
+            <a:p>
+              <a:endParaRPr lang="en-US" dirty="0">
+                <a:solidFill>
+                  <a:schemeClr val="tx1"/>
+                </a:solidFill>
+                <a:latin typeface="Lucida Bright" panose="02040602050505020304" pitchFamily="18" charset="0"/>
+              </a:endParaRPr>
+            </a:p>
+          </p:txBody>
+        </p:sp>
+        <p:sp>
+          <p:nvSpPr>
+            <p:cNvPr id="16" name="Rectangle 15"/>
+            <p:cNvSpPr/>
+            <p:nvPr/>
+          </p:nvSpPr>
+          <p:spPr>
+            <a:xfrm>
+              <a:off x="5786658" y="3320181"/>
+              <a:ext cx="228600" cy="228600"/>
+            </a:xfrm>
+            <a:prstGeom prst="rect">
+              <a:avLst/>
+            </a:prstGeom>
+            <a:noFill/>
+            <a:ln>
+              <a:solidFill>
+                <a:schemeClr val="bg1">
+                  <a:lumMod val="65000"/>
+                </a:schemeClr>
+              </a:solidFill>
+            </a:ln>
+          </p:spPr>
+          <p:style>
+            <a:lnRef idx="2">
+              <a:schemeClr val="accent1">
+                <a:shade val="50000"/>
+              </a:schemeClr>
+            </a:lnRef>
+            <a:fillRef idx="1">
+              <a:schemeClr val="accent1"/>
+            </a:fillRef>
+            <a:effectRef idx="0">
+              <a:schemeClr val="accent1"/>
+            </a:effectRef>
+            <a:fontRef idx="minor">
+              <a:schemeClr val="lt1"/>
+            </a:fontRef>
+          </p:style>
+          <p:txBody>
+            <a:bodyPr lIns="731520" tIns="45720" rIns="91440" rtlCol="0" anchor="ctr" anchorCtr="0"/>
+            <a:lstStyle/>
+            <a:p>
+              <a:endParaRPr lang="en-US" dirty="0">
+                <a:solidFill>
+                  <a:schemeClr val="tx1"/>
+                </a:solidFill>
+                <a:latin typeface="Lucida Bright" panose="02040602050505020304" pitchFamily="18" charset="0"/>
+              </a:endParaRPr>
+            </a:p>
+          </p:txBody>
+        </p:sp>
+        <p:sp>
+          <p:nvSpPr>
+            <p:cNvPr id="74" name="Rectangle 73"/>
+            <p:cNvSpPr/>
+            <p:nvPr/>
+          </p:nvSpPr>
+          <p:spPr>
+            <a:xfrm>
+              <a:off x="5786658" y="3649365"/>
+              <a:ext cx="228600" cy="228600"/>
+            </a:xfrm>
+            <a:prstGeom prst="rect">
+              <a:avLst/>
+            </a:prstGeom>
+            <a:noFill/>
+            <a:ln>
+              <a:solidFill>
+                <a:schemeClr val="bg1">
+                  <a:lumMod val="65000"/>
+                </a:schemeClr>
+              </a:solidFill>
+            </a:ln>
+          </p:spPr>
+          <p:style>
+            <a:lnRef idx="2">
+              <a:schemeClr val="accent1">
+                <a:shade val="50000"/>
+              </a:schemeClr>
+            </a:lnRef>
+            <a:fillRef idx="1">
+              <a:schemeClr val="accent1"/>
+            </a:fillRef>
+            <a:effectRef idx="0">
+              <a:schemeClr val="accent1"/>
+            </a:effectRef>
+            <a:fontRef idx="minor">
+              <a:schemeClr val="lt1"/>
+            </a:fontRef>
+          </p:style>
+          <p:txBody>
+            <a:bodyPr lIns="731520" tIns="45720" rIns="91440" rtlCol="0" anchor="ctr" anchorCtr="0"/>
+            <a:lstStyle/>
+            <a:p>
+              <a:endParaRPr lang="en-US" dirty="0">
+                <a:solidFill>
+                  <a:schemeClr val="tx1"/>
+                </a:solidFill>
+                <a:latin typeface="Lucida Bright" panose="02040602050505020304" pitchFamily="18" charset="0"/>
+              </a:endParaRPr>
+            </a:p>
+          </p:txBody>
+        </p:sp>
+        <p:sp>
+          <p:nvSpPr>
+            <p:cNvPr id="114" name="Rectangle 113"/>
+            <p:cNvSpPr/>
+            <p:nvPr/>
+          </p:nvSpPr>
+          <p:spPr>
+            <a:xfrm>
+              <a:off x="6015258" y="3210453"/>
+              <a:ext cx="2138142" cy="777240"/>
+            </a:xfrm>
+            <a:prstGeom prst="rect">
+              <a:avLst/>
+            </a:prstGeom>
+            <a:noFill/>
+            <a:ln>
+              <a:noFill/>
+            </a:ln>
+          </p:spPr>
+          <p:style>
+            <a:lnRef idx="2">
+              <a:schemeClr val="accent1">
+                <a:shade val="50000"/>
+              </a:schemeClr>
+            </a:lnRef>
+            <a:fillRef idx="1">
+              <a:schemeClr val="accent1"/>
+            </a:fillRef>
+            <a:effectRef idx="0">
+              <a:schemeClr val="accent1"/>
+            </a:effectRef>
+            <a:fontRef idx="minor">
+              <a:schemeClr val="lt1"/>
+            </a:fontRef>
+          </p:style>
+          <p:txBody>
+            <a:bodyPr lIns="91440" tIns="45720" rIns="91440" rtlCol="0" anchor="ctr" anchorCtr="0"/>
+            <a:lstStyle/>
+            <a:p>
+              <a:pPr algn="ctr"/>
+              <a:r>
+                <a:rPr lang="en-US" dirty="0" smtClean="0">
+                  <a:solidFill>
+                    <a:schemeClr val="tx1"/>
+                  </a:solidFill>
+                  <a:latin typeface="Lucida Bright" panose="02040602050505020304" pitchFamily="18" charset="0"/>
+                </a:rPr>
+                <a:t>State</a:t>
+              </a:r>
+              <a:endParaRPr lang="en-US" dirty="0">
+                <a:solidFill>
+                  <a:schemeClr val="tx1"/>
+                </a:solidFill>
+                <a:latin typeface="Lucida Bright" panose="02040602050505020304" pitchFamily="18" charset="0"/>
+              </a:endParaRPr>
+            </a:p>
+          </p:txBody>
+        </p:sp>
+        <p:sp>
+          <p:nvSpPr>
+            <p:cNvPr id="135" name="Rectangle 134"/>
+            <p:cNvSpPr/>
+            <p:nvPr/>
+          </p:nvSpPr>
+          <p:spPr>
+            <a:xfrm>
+              <a:off x="5786658" y="3320181"/>
+              <a:ext cx="228586" cy="123444"/>
+            </a:xfrm>
+            <a:prstGeom prst="rect">
+              <a:avLst/>
+            </a:prstGeom>
+            <a:noFill/>
+            <a:ln>
+              <a:noFill/>
+            </a:ln>
+          </p:spPr>
+          <p:style>
+            <a:lnRef idx="2">
+              <a:schemeClr val="accent1">
+                <a:shade val="50000"/>
+              </a:schemeClr>
+            </a:lnRef>
+            <a:fillRef idx="1">
+              <a:schemeClr val="accent1"/>
+            </a:fillRef>
+            <a:effectRef idx="0">
+              <a:schemeClr val="accent1"/>
+            </a:effectRef>
+            <a:fontRef idx="minor">
+              <a:schemeClr val="lt1"/>
+            </a:fontRef>
+          </p:style>
+          <p:txBody>
+            <a:bodyPr lIns="731520" tIns="45720" rIns="91440" rtlCol="0" anchor="ctr" anchorCtr="0"/>
+            <a:lstStyle/>
+            <a:p>
+              <a:endParaRPr lang="en-US" dirty="0">
+                <a:solidFill>
+                  <a:schemeClr val="tx1"/>
+                </a:solidFill>
+                <a:latin typeface="Lucida Bright" panose="02040602050505020304" pitchFamily="18" charset="0"/>
+              </a:endParaRPr>
+            </a:p>
+          </p:txBody>
+        </p:sp>
+        <p:sp>
+          <p:nvSpPr>
+            <p:cNvPr id="137" name="Rectangle 136"/>
+            <p:cNvSpPr/>
+            <p:nvPr/>
+          </p:nvSpPr>
+          <p:spPr>
+            <a:xfrm>
+              <a:off x="5786658" y="3649365"/>
+              <a:ext cx="228586" cy="123444"/>
+            </a:xfrm>
+            <a:prstGeom prst="rect">
+              <a:avLst/>
+            </a:prstGeom>
+            <a:noFill/>
+            <a:ln>
+              <a:noFill/>
+            </a:ln>
+          </p:spPr>
+          <p:style>
+            <a:lnRef idx="2">
+              <a:schemeClr val="accent1">
+                <a:shade val="50000"/>
+              </a:schemeClr>
+            </a:lnRef>
+            <a:fillRef idx="1">
+              <a:schemeClr val="accent1"/>
+            </a:fillRef>
+            <a:effectRef idx="0">
+              <a:schemeClr val="accent1"/>
+            </a:effectRef>
+            <a:fontRef idx="minor">
+              <a:schemeClr val="lt1"/>
+            </a:fontRef>
+          </p:style>
+          <p:txBody>
+            <a:bodyPr lIns="731520" tIns="45720" rIns="91440" rtlCol="0" anchor="ctr" anchorCtr="0"/>
+            <a:lstStyle/>
+            <a:p>
+              <a:endParaRPr lang="en-US" dirty="0">
+                <a:solidFill>
+                  <a:schemeClr val="tx1"/>
+                </a:solidFill>
+                <a:latin typeface="Lucida Bright" panose="02040602050505020304" pitchFamily="18" charset="0"/>
+              </a:endParaRPr>
+            </a:p>
+          </p:txBody>
+        </p:sp>
+      </p:grpSp>
+      <p:grpSp>
+        <p:nvGrpSpPr>
+          <p:cNvPr id="2" name="Group 1"/>
+          <p:cNvGrpSpPr/>
+          <p:nvPr/>
+        </p:nvGrpSpPr>
+        <p:grpSpPr>
+          <a:xfrm>
+            <a:off x="5410228" y="4131425"/>
+            <a:ext cx="2476470" cy="640080"/>
+            <a:chOff x="5676916" y="3987693"/>
+            <a:chExt cx="2476470" cy="777240"/>
+          </a:xfrm>
+        </p:grpSpPr>
+        <p:sp>
+          <p:nvSpPr>
+            <p:cNvPr id="34" name="Rectangle 33"/>
+            <p:cNvSpPr/>
+            <p:nvPr/>
+          </p:nvSpPr>
+          <p:spPr>
+            <a:xfrm>
+              <a:off x="5676916" y="3987693"/>
+              <a:ext cx="2476470" cy="777240"/>
+            </a:xfrm>
+            <a:prstGeom prst="rect">
+              <a:avLst/>
+            </a:prstGeom>
+            <a:noFill/>
+            <a:ln>
+              <a:solidFill>
+                <a:schemeClr val="bg1">
+                  <a:lumMod val="65000"/>
+                </a:schemeClr>
+              </a:solidFill>
+            </a:ln>
+          </p:spPr>
+          <p:style>
+            <a:lnRef idx="2">
+              <a:schemeClr val="accent1">
+                <a:shade val="50000"/>
+              </a:schemeClr>
+            </a:lnRef>
+            <a:fillRef idx="1">
+              <a:schemeClr val="accent1"/>
+            </a:fillRef>
+            <a:effectRef idx="0">
+              <a:schemeClr val="accent1"/>
+            </a:effectRef>
+            <a:fontRef idx="minor">
+              <a:schemeClr val="lt1"/>
+            </a:fontRef>
+          </p:style>
+          <p:txBody>
+            <a:bodyPr lIns="731520" tIns="45720" rIns="91440" rtlCol="0" anchor="ctr" anchorCtr="0"/>
+            <a:lstStyle/>
+            <a:p>
+              <a:endParaRPr lang="en-US" dirty="0">
+                <a:solidFill>
+                  <a:schemeClr val="tx1"/>
+                </a:solidFill>
+                <a:latin typeface="Lucida Bright" panose="02040602050505020304" pitchFamily="18" charset="0"/>
+              </a:endParaRPr>
+            </a:p>
+          </p:txBody>
+        </p:sp>
+        <p:sp>
+          <p:nvSpPr>
+            <p:cNvPr id="35" name="Rectangle 34"/>
+            <p:cNvSpPr/>
+            <p:nvPr/>
+          </p:nvSpPr>
+          <p:spPr>
+            <a:xfrm>
+              <a:off x="5786644" y="4262775"/>
+              <a:ext cx="228600" cy="228600"/>
+            </a:xfrm>
+            <a:prstGeom prst="rect">
+              <a:avLst/>
+            </a:prstGeom>
+            <a:noFill/>
+            <a:ln>
+              <a:solidFill>
+                <a:schemeClr val="bg1">
+                  <a:lumMod val="65000"/>
+                </a:schemeClr>
+              </a:solidFill>
+            </a:ln>
+          </p:spPr>
+          <p:style>
+            <a:lnRef idx="2">
+              <a:schemeClr val="accent1">
+                <a:shade val="50000"/>
+              </a:schemeClr>
+            </a:lnRef>
+            <a:fillRef idx="1">
+              <a:schemeClr val="accent1"/>
+            </a:fillRef>
+            <a:effectRef idx="0">
+              <a:schemeClr val="accent1"/>
+            </a:effectRef>
+            <a:fontRef idx="minor">
+              <a:schemeClr val="lt1"/>
+            </a:fontRef>
+          </p:style>
+          <p:txBody>
+            <a:bodyPr lIns="731520" tIns="45720" rIns="91440" rtlCol="0" anchor="ctr" anchorCtr="0"/>
+            <a:lstStyle/>
+            <a:p>
+              <a:endParaRPr lang="en-US" dirty="0">
+                <a:solidFill>
+                  <a:schemeClr val="tx1"/>
+                </a:solidFill>
+                <a:latin typeface="Lucida Bright" panose="02040602050505020304" pitchFamily="18" charset="0"/>
+              </a:endParaRPr>
+            </a:p>
+          </p:txBody>
+        </p:sp>
+        <p:sp>
+          <p:nvSpPr>
+            <p:cNvPr id="36" name="Rectangle 35"/>
+            <p:cNvSpPr/>
+            <p:nvPr/>
+          </p:nvSpPr>
+          <p:spPr>
+            <a:xfrm>
+              <a:off x="6015244" y="3987693"/>
+              <a:ext cx="2138142" cy="777240"/>
+            </a:xfrm>
+            <a:prstGeom prst="rect">
+              <a:avLst/>
+            </a:prstGeom>
+            <a:noFill/>
+            <a:ln>
+              <a:noFill/>
+            </a:ln>
+          </p:spPr>
+          <p:style>
+            <a:lnRef idx="2">
+              <a:schemeClr val="accent1">
+                <a:shade val="50000"/>
+              </a:schemeClr>
+            </a:lnRef>
+            <a:fillRef idx="1">
+              <a:schemeClr val="accent1"/>
+            </a:fillRef>
+            <a:effectRef idx="0">
+              <a:schemeClr val="accent1"/>
+            </a:effectRef>
+            <a:fontRef idx="minor">
+              <a:schemeClr val="lt1"/>
+            </a:fontRef>
+          </p:style>
+          <p:txBody>
+            <a:bodyPr lIns="91440" tIns="45720" rIns="91440" rtlCol="0" anchor="ctr" anchorCtr="0"/>
+            <a:lstStyle/>
+            <a:p>
+              <a:pPr algn="ctr"/>
+              <a:r>
+                <a:rPr lang="en-US" dirty="0" smtClean="0">
+                  <a:solidFill>
+                    <a:schemeClr val="tx1"/>
+                  </a:solidFill>
+                  <a:latin typeface="Lucida Bright" panose="02040602050505020304" pitchFamily="18" charset="0"/>
+                </a:rPr>
+                <a:t>Evolver</a:t>
+              </a:r>
+              <a:endParaRPr lang="en-US" dirty="0">
+                <a:solidFill>
+                  <a:schemeClr val="tx1"/>
+                </a:solidFill>
+                <a:latin typeface="Lucida Bright" panose="02040602050505020304" pitchFamily="18" charset="0"/>
+              </a:endParaRPr>
+            </a:p>
+          </p:txBody>
+        </p:sp>
+        <p:sp>
+          <p:nvSpPr>
+            <p:cNvPr id="37" name="Rectangle 36"/>
+            <p:cNvSpPr/>
+            <p:nvPr/>
+          </p:nvSpPr>
+          <p:spPr>
+            <a:xfrm>
+              <a:off x="5786644" y="4262775"/>
+              <a:ext cx="228586" cy="123444"/>
+            </a:xfrm>
+            <a:prstGeom prst="rect">
+              <a:avLst/>
+            </a:prstGeom>
+            <a:noFill/>
+            <a:ln>
+              <a:noFill/>
+            </a:ln>
+          </p:spPr>
+          <p:style>
+            <a:lnRef idx="2">
+              <a:schemeClr val="accent1">
+                <a:shade val="50000"/>
+              </a:schemeClr>
+            </a:lnRef>
+            <a:fillRef idx="1">
+              <a:schemeClr val="accent1"/>
+            </a:fillRef>
+            <a:effectRef idx="0">
+              <a:schemeClr val="accent1"/>
+            </a:effectRef>
+            <a:fontRef idx="minor">
+              <a:schemeClr val="lt1"/>
+            </a:fontRef>
+          </p:style>
+          <p:txBody>
+            <a:bodyPr lIns="731520" tIns="45720" rIns="91440" rtlCol="0" anchor="ctr" anchorCtr="0"/>
+            <a:lstStyle/>
+            <a:p>
+              <a:endParaRPr lang="en-US" dirty="0">
+                <a:solidFill>
+                  <a:schemeClr val="tx1"/>
+                </a:solidFill>
+                <a:latin typeface="Lucida Bright" panose="02040602050505020304" pitchFamily="18" charset="0"/>
+              </a:endParaRPr>
+            </a:p>
+          </p:txBody>
+        </p:sp>
+      </p:grpSp>
+      <p:cxnSp>
+        <p:nvCxnSpPr>
+          <p:cNvPr id="98" name="Straight Arrow Connector 97"/>
+          <p:cNvCxnSpPr>
+            <a:endCxn id="81" idx="4"/>
+          </p:cNvCxnSpPr>
+          <p:nvPr/>
+        </p:nvCxnSpPr>
+        <p:spPr>
+          <a:xfrm>
+            <a:off x="5105400" y="2573229"/>
+            <a:ext cx="528828" cy="0"/>
+          </a:xfrm>
+          <a:prstGeom prst="straightConnector1">
+            <a:avLst/>
+          </a:prstGeom>
+          <a:ln w="19050">
+            <a:solidFill>
+              <a:schemeClr val="tx1"/>
+            </a:solidFill>
+            <a:tailEnd type="triangle" w="med" len="med"/>
+          </a:ln>
+        </p:spPr>
+        <p:style>
+          <a:lnRef idx="1">
+            <a:schemeClr val="accent1"/>
+          </a:lnRef>
+          <a:fillRef idx="0">
+            <a:schemeClr val="accent1"/>
+          </a:fillRef>
+          <a:effectRef idx="0">
+            <a:schemeClr val="accent1"/>
+          </a:effectRef>
+          <a:fontRef idx="minor">
+            <a:schemeClr val="tx1"/>
+          </a:fontRef>
+        </p:style>
+      </p:cxnSp>
+      <p:cxnSp>
+        <p:nvCxnSpPr>
+          <p:cNvPr id="95" name="Straight Arrow Connector 94"/>
+          <p:cNvCxnSpPr>
+            <a:endCxn id="119" idx="2"/>
+          </p:cNvCxnSpPr>
+          <p:nvPr/>
+        </p:nvCxnSpPr>
+        <p:spPr>
+          <a:xfrm>
+            <a:off x="5105400" y="1442103"/>
+            <a:ext cx="528821" cy="0"/>
+          </a:xfrm>
+          <a:prstGeom prst="straightConnector1">
+            <a:avLst/>
+          </a:prstGeom>
+          <a:ln w="19050">
+            <a:solidFill>
+              <a:schemeClr val="tx1"/>
+            </a:solidFill>
+            <a:tailEnd type="triangle" w="med" len="med"/>
+          </a:ln>
+        </p:spPr>
+        <p:style>
+          <a:lnRef idx="1">
+            <a:schemeClr val="accent1"/>
+          </a:lnRef>
+          <a:fillRef idx="0">
+            <a:schemeClr val="accent1"/>
+          </a:fillRef>
+          <a:effectRef idx="0">
+            <a:schemeClr val="accent1"/>
+          </a:effectRef>
+          <a:fontRef idx="minor">
+            <a:schemeClr val="tx1"/>
+          </a:fontRef>
+        </p:style>
+      </p:cxnSp>
+      <p:cxnSp>
+        <p:nvCxnSpPr>
+          <p:cNvPr id="99" name="Straight Arrow Connector 98"/>
+          <p:cNvCxnSpPr>
+            <a:endCxn id="137" idx="2"/>
+          </p:cNvCxnSpPr>
+          <p:nvPr/>
+        </p:nvCxnSpPr>
+        <p:spPr>
+          <a:xfrm>
+            <a:off x="5105400" y="3582834"/>
+            <a:ext cx="528835" cy="7531"/>
+          </a:xfrm>
+          <a:prstGeom prst="straightConnector1">
+            <a:avLst/>
+          </a:prstGeom>
+          <a:ln w="19050">
+            <a:solidFill>
+              <a:schemeClr val="tx1"/>
+            </a:solidFill>
+            <a:tailEnd type="triangle" w="med" len="med"/>
+          </a:ln>
+        </p:spPr>
+        <p:style>
+          <a:lnRef idx="1">
+            <a:schemeClr val="accent1"/>
+          </a:lnRef>
+          <a:fillRef idx="0">
+            <a:schemeClr val="accent1"/>
+          </a:fillRef>
+          <a:effectRef idx="0">
+            <a:schemeClr val="accent1"/>
+          </a:effectRef>
+          <a:fontRef idx="minor">
+            <a:schemeClr val="tx1"/>
+          </a:fontRef>
+        </p:style>
+      </p:cxnSp>
+      <p:cxnSp>
+        <p:nvCxnSpPr>
+          <p:cNvPr id="105" name="Straight Arrow Connector 104"/>
+          <p:cNvCxnSpPr>
+            <a:stCxn id="110" idx="2"/>
+            <a:endCxn id="82" idx="7"/>
+          </p:cNvCxnSpPr>
+          <p:nvPr/>
+        </p:nvCxnSpPr>
+        <p:spPr>
+          <a:xfrm flipH="1">
+            <a:off x="5630995" y="1753985"/>
+            <a:ext cx="1186604" cy="554578"/>
+          </a:xfrm>
+          <a:prstGeom prst="straightConnector1">
+            <a:avLst/>
+          </a:prstGeom>
+          <a:ln w="19050">
+            <a:solidFill>
+              <a:schemeClr val="tx1"/>
+            </a:solidFill>
+            <a:headEnd type="oval"/>
+            <a:tailEnd type="triangle"/>
+          </a:ln>
+        </p:spPr>
+        <p:style>
+          <a:lnRef idx="1">
+            <a:schemeClr val="accent1"/>
+          </a:lnRef>
+          <a:fillRef idx="0">
+            <a:schemeClr val="accent1"/>
+          </a:fillRef>
+          <a:effectRef idx="0">
+            <a:schemeClr val="accent1"/>
+          </a:effectRef>
+          <a:fontRef idx="minor">
+            <a:schemeClr val="tx1"/>
+          </a:fontRef>
+        </p:style>
+      </p:cxnSp>
+      <p:cxnSp>
+        <p:nvCxnSpPr>
+          <p:cNvPr id="106" name="Straight Arrow Connector 105"/>
+          <p:cNvCxnSpPr>
+            <a:stCxn id="113" idx="2"/>
+            <a:endCxn id="135" idx="2"/>
+          </p:cNvCxnSpPr>
+          <p:nvPr/>
+        </p:nvCxnSpPr>
+        <p:spPr>
+          <a:xfrm flipH="1">
+            <a:off x="5634235" y="2761488"/>
+            <a:ext cx="1183364" cy="557784"/>
+          </a:xfrm>
+          <a:prstGeom prst="straightConnector1">
+            <a:avLst/>
+          </a:prstGeom>
+          <a:ln w="19050">
+            <a:solidFill>
+              <a:schemeClr val="tx1"/>
+            </a:solidFill>
+            <a:headEnd type="oval"/>
+            <a:tailEnd type="triangle"/>
+          </a:ln>
+        </p:spPr>
+        <p:style>
+          <a:lnRef idx="1">
+            <a:schemeClr val="accent1"/>
+          </a:lnRef>
+          <a:fillRef idx="0">
+            <a:schemeClr val="accent1"/>
+          </a:fillRef>
+          <a:effectRef idx="0">
+            <a:schemeClr val="accent1"/>
+          </a:effectRef>
+          <a:fontRef idx="minor">
+            <a:schemeClr val="tx1"/>
+          </a:fontRef>
+        </p:style>
+      </p:cxnSp>
+      <p:cxnSp>
+        <p:nvCxnSpPr>
+          <p:cNvPr id="39" name="Straight Arrow Connector 38"/>
+          <p:cNvCxnSpPr>
+            <a:stCxn id="114" idx="2"/>
+            <a:endCxn id="37" idx="2"/>
+          </p:cNvCxnSpPr>
+          <p:nvPr/>
+        </p:nvCxnSpPr>
+        <p:spPr>
+          <a:xfrm flipH="1">
+            <a:off x="5634249" y="3767328"/>
+            <a:ext cx="1183364" cy="692295"/>
+          </a:xfrm>
+          <a:prstGeom prst="straightConnector1">
+            <a:avLst/>
+          </a:prstGeom>
+          <a:ln w="19050">
+            <a:solidFill>
+              <a:schemeClr val="tx1"/>
+            </a:solidFill>
+            <a:headEnd type="oval"/>
+            <a:tailEnd type="triangle"/>
+          </a:ln>
+        </p:spPr>
+        <p:style>
+          <a:lnRef idx="1">
+            <a:schemeClr val="accent1"/>
+          </a:lnRef>
+          <a:fillRef idx="0">
+            <a:schemeClr val="accent1"/>
+          </a:fillRef>
+          <a:effectRef idx="0">
+            <a:schemeClr val="accent1"/>
+          </a:effectRef>
+          <a:fontRef idx="minor">
+            <a:schemeClr val="tx1"/>
+          </a:fontRef>
+        </p:style>
+      </p:cxnSp>
+    </p:spTree>
+    <p:extLst>
+      <p:ext uri="{BB962C8B-B14F-4D97-AF65-F5344CB8AC3E}">
+        <p14:creationId xmlns:p14="http://schemas.microsoft.com/office/powerpoint/2010/main" val="4224749294"/>
+      </p:ext>
+    </p:extLst>
+  </p:cSld>
+  <p:clrMapOvr>
+    <a:masterClrMapping/>
+  </p:clrMapOvr>
+</p:sld>
+</file>
+
 <file path=ppt/theme/theme1.xml><?xml version="1.0" encoding="utf-8"?>
 <a:theme xmlns:a="http://schemas.openxmlformats.org/drawingml/2006/main" name="Office Theme">
   <a:themeElements>

</xml_diff>